<commit_message>
updates to readme and slide deck.
</commit_message>
<xml_diff>
--- a/Finding Anagrams v1.0.pptx
+++ b/Finding Anagrams v1.0.pptx
@@ -4979,8 +4979,12 @@
           </a:p>
           <a:p>
             <a:r>
-              <a:rPr lang="en-US" dirty="0"/>
-              <a:t>February 20, 2021</a:t>
+              <a:rPr lang="en-US"/>
+              <a:t>February 22, </a:t>
+            </a:r>
+            <a:r>
+              <a:rPr lang="en-US" dirty="0"/>
+              <a:t>2021</a:t>
             </a:r>
           </a:p>
         </p:txBody>

</xml_diff>